<commit_message>
MAD Lab2 and CSAD Lab2 created
</commit_message>
<xml_diff>
--- a/Physics/Lectures and Tutorials/Chapter1-Physical quantities/MS864M_Chapter 1 - Physical quantities_new design(2).pptx
+++ b/Physics/Lectures and Tutorials/Chapter1-Physical quantities/MS864M_Chapter 1 - Physical quantities_new design(2).pptx
@@ -10227,7 +10227,7 @@
           <a:graphicData uri="http://schemas.openxmlformats.org/presentationml/2006/ole">
             <mc:AlternateContent xmlns:mc="http://schemas.openxmlformats.org/markup-compatibility/2006">
               <mc:Choice xmlns:v="urn:schemas-microsoft-com:vml" Requires="v">
-                <p:oleObj spid="_x0000_s336991" name="Equation" r:id="rId3" imgW="1079280" imgH="736560" progId="Equation.DSMT4">
+                <p:oleObj spid="_x0000_s337000" name="Equation" r:id="rId3" imgW="1079280" imgH="736560" progId="Equation.DSMT4">
                   <p:embed/>
                 </p:oleObj>
               </mc:Choice>
@@ -10297,7 +10297,7 @@
           <a:graphicData uri="http://schemas.openxmlformats.org/presentationml/2006/ole">
             <mc:AlternateContent xmlns:mc="http://schemas.openxmlformats.org/markup-compatibility/2006">
               <mc:Choice xmlns:v="urn:schemas-microsoft-com:vml" Requires="v">
-                <p:oleObj spid="_x0000_s336992" name="Equation" r:id="rId5" imgW="660240" imgH="736560" progId="Equation.DSMT4">
+                <p:oleObj spid="_x0000_s337001" name="Equation" r:id="rId5" imgW="660240" imgH="736560" progId="Equation.DSMT4">
                   <p:embed/>
                 </p:oleObj>
               </mc:Choice>
@@ -10367,7 +10367,7 @@
           <a:graphicData uri="http://schemas.openxmlformats.org/presentationml/2006/ole">
             <mc:AlternateContent xmlns:mc="http://schemas.openxmlformats.org/markup-compatibility/2006">
               <mc:Choice xmlns:v="urn:schemas-microsoft-com:vml" Requires="v">
-                <p:oleObj spid="_x0000_s336993" name="Equation" r:id="rId7" imgW="2197080" imgH="774360" progId="Equation.DSMT4">
+                <p:oleObj spid="_x0000_s337002" name="Equation" r:id="rId7" imgW="2197080" imgH="774360" progId="Equation.DSMT4">
                   <p:embed/>
                 </p:oleObj>
               </mc:Choice>
@@ -11209,7 +11209,7 @@
           <a:graphicData uri="http://schemas.openxmlformats.org/presentationml/2006/ole">
             <mc:AlternateContent xmlns:mc="http://schemas.openxmlformats.org/markup-compatibility/2006">
               <mc:Choice xmlns:v="urn:schemas-microsoft-com:vml" Requires="v">
-                <p:oleObj spid="_x0000_s337982" name="Equation" r:id="rId3" imgW="1854000" imgH="774360" progId="Equation.DSMT4">
+                <p:oleObj spid="_x0000_s337988" name="Equation" r:id="rId3" imgW="1854000" imgH="774360" progId="Equation.DSMT4">
                   <p:embed/>
                 </p:oleObj>
               </mc:Choice>
@@ -11279,7 +11279,7 @@
           <a:graphicData uri="http://schemas.openxmlformats.org/presentationml/2006/ole">
             <mc:AlternateContent xmlns:mc="http://schemas.openxmlformats.org/markup-compatibility/2006">
               <mc:Choice xmlns:v="urn:schemas-microsoft-com:vml" Requires="v">
-                <p:oleObj spid="_x0000_s337983" name="Equation" r:id="rId5" imgW="1688760" imgH="774360" progId="Equation.DSMT4">
+                <p:oleObj spid="_x0000_s337989" name="Equation" r:id="rId5" imgW="1688760" imgH="774360" progId="Equation.DSMT4">
                   <p:embed/>
                 </p:oleObj>
               </mc:Choice>
@@ -11614,7 +11614,7 @@
           <a:graphicData uri="http://schemas.openxmlformats.org/presentationml/2006/ole">
             <mc:AlternateContent xmlns:mc="http://schemas.openxmlformats.org/markup-compatibility/2006">
               <mc:Choice xmlns:v="urn:schemas-microsoft-com:vml" Requires="v">
-                <p:oleObj spid="_x0000_s339006" name="Equation" r:id="rId3" imgW="1155600" imgH="393480" progId="Equation.DSMT4">
+                <p:oleObj spid="_x0000_s339012" name="Equation" r:id="rId3" imgW="1155600" imgH="393480" progId="Equation.DSMT4">
                   <p:embed/>
                 </p:oleObj>
               </mc:Choice>
@@ -11684,7 +11684,7 @@
           <a:graphicData uri="http://schemas.openxmlformats.org/presentationml/2006/ole">
             <mc:AlternateContent xmlns:mc="http://schemas.openxmlformats.org/markup-compatibility/2006">
               <mc:Choice xmlns:v="urn:schemas-microsoft-com:vml" Requires="v">
-                <p:oleObj spid="_x0000_s339007" name="Equation" r:id="rId5" imgW="5397480" imgH="3848040" progId="Equation.DSMT4">
+                <p:oleObj spid="_x0000_s339013" name="Equation" r:id="rId5" imgW="5397480" imgH="3848040" progId="Equation.DSMT4">
                   <p:embed/>
                 </p:oleObj>
               </mc:Choice>
@@ -12817,7 +12817,7 @@
           <a:graphicData uri="http://schemas.openxmlformats.org/presentationml/2006/ole">
             <mc:AlternateContent xmlns:mc="http://schemas.openxmlformats.org/markup-compatibility/2006">
               <mc:Choice xmlns:v="urn:schemas-microsoft-com:vml" Requires="v">
-                <p:oleObj spid="_x0000_s340020" name="Equation" r:id="rId3" imgW="647640" imgH="723600" progId="Equation.DSMT4">
+                <p:oleObj spid="_x0000_s340026" name="Equation" r:id="rId3" imgW="647640" imgH="723600" progId="Equation.DSMT4">
                   <p:embed/>
                 </p:oleObj>
               </mc:Choice>
@@ -12887,7 +12887,7 @@
           <a:graphicData uri="http://schemas.openxmlformats.org/presentationml/2006/ole">
             <mc:AlternateContent xmlns:mc="http://schemas.openxmlformats.org/markup-compatibility/2006">
               <mc:Choice xmlns:v="urn:schemas-microsoft-com:vml" Requires="v">
-                <p:oleObj spid="_x0000_s340021" name="Equation" r:id="rId5" imgW="1612800" imgH="723600" progId="Equation.DSMT4">
+                <p:oleObj spid="_x0000_s340027" name="Equation" r:id="rId5" imgW="1612800" imgH="723600" progId="Equation.DSMT4">
                   <p:embed/>
                 </p:oleObj>
               </mc:Choice>
@@ -15664,13 +15664,8 @@
             </a:pPr>
             <a:r>
               <a:rPr lang="en-GB" dirty="0"/>
-              <a:t>	   8.76 rounded to 8.82 </a:t>
-            </a:r>
-            <a:r>
-              <a:rPr lang="en-GB" dirty="0" err="1"/>
-              <a:t>s.f.</a:t>
-            </a:r>
-            <a:endParaRPr lang="en-GB" dirty="0"/>
+              <a:t>	   8.76 rounded to 8.82    2s.f.</a:t>
+            </a:r>
           </a:p>
           <a:p>
             <a:endParaRPr lang="en-SG" dirty="0"/>
@@ -16254,7 +16249,7 @@
           <a:graphicData uri="http://schemas.openxmlformats.org/presentationml/2006/ole">
             <mc:AlternateContent xmlns:mc="http://schemas.openxmlformats.org/markup-compatibility/2006">
               <mc:Choice xmlns:v="urn:schemas-microsoft-com:vml" Requires="v">
-                <p:oleObj spid="_x0000_s341009" name="Equation" r:id="rId3" imgW="203040" imgH="203040" progId="Equation.DSMT4">
+                <p:oleObj spid="_x0000_s341012" name="Equation" r:id="rId3" imgW="203040" imgH="203040" progId="Equation.DSMT4">
                   <p:embed/>
                 </p:oleObj>
               </mc:Choice>

</xml_diff>

<commit_message>
MAD Lab2 done and Lab3 started
</commit_message>
<xml_diff>
--- a/Physics/Lectures and Tutorials/Chapter1-Physical quantities/MS864M_Chapter 1 - Physical quantities_new design(2).pptx
+++ b/Physics/Lectures and Tutorials/Chapter1-Physical quantities/MS864M_Chapter 1 - Physical quantities_new design(2).pptx
@@ -229,7 +229,7 @@
           <a:p>
             <a:fld id="{3054530E-66E8-4EEF-8660-8A53FF529BDE}" type="datetimeFigureOut">
               <a:rPr lang="en-SG" smtClean="0"/>
-              <a:t>22/10/2018</a:t>
+              <a:t>29/10/2018</a:t>
             </a:fld>
             <a:endParaRPr lang="en-SG"/>
           </a:p>
@@ -818,7 +818,7 @@
           <a:p>
             <a:fld id="{C9C4BACD-157C-49D0-94EF-AA1F6A6AD876}" type="datetime1">
               <a:rPr lang="en-US" smtClean="0"/>
-              <a:t>10/22/2018</a:t>
+              <a:t>10/29/2018</a:t>
             </a:fld>
             <a:endParaRPr lang="en-US" dirty="0"/>
           </a:p>
@@ -1046,7 +1046,7 @@
           <a:p>
             <a:fld id="{2EA1A6BC-11B1-4E16-919A-AFB5EDCD6744}" type="datetime1">
               <a:rPr lang="en-US" smtClean="0"/>
-              <a:t>10/22/2018</a:t>
+              <a:t>10/29/2018</a:t>
             </a:fld>
             <a:endParaRPr lang="en-US" dirty="0"/>
           </a:p>
@@ -1239,7 +1239,7 @@
           <a:p>
             <a:fld id="{7D6B57A0-298C-4132-B714-B2E4F7F5DAD3}" type="datetime1">
               <a:rPr lang="en-US" smtClean="0"/>
-              <a:t>10/22/2018</a:t>
+              <a:t>10/29/2018</a:t>
             </a:fld>
             <a:endParaRPr lang="en-US" dirty="0"/>
           </a:p>
@@ -1463,7 +1463,7 @@
           <a:p>
             <a:fld id="{784773E5-5F31-491B-89B9-F93C36036A5D}" type="datetime1">
               <a:rPr lang="en-US" smtClean="0"/>
-              <a:t>10/22/2018</a:t>
+              <a:t>10/29/2018</a:t>
             </a:fld>
             <a:endParaRPr lang="en-US" dirty="0"/>
           </a:p>
@@ -1747,7 +1747,7 @@
           <a:p>
             <a:fld id="{53800E3F-A486-4059-9240-A559DDCADE81}" type="datetime1">
               <a:rPr lang="en-US" smtClean="0"/>
-              <a:t>10/22/2018</a:t>
+              <a:t>10/29/2018</a:t>
             </a:fld>
             <a:endParaRPr lang="en-US" dirty="0"/>
           </a:p>
@@ -2035,7 +2035,7 @@
           <a:p>
             <a:fld id="{A9CAAD29-F102-4008-BC34-B05BB0FD2B67}" type="datetime1">
               <a:rPr lang="en-US" smtClean="0"/>
-              <a:t>10/22/2018</a:t>
+              <a:t>10/29/2018</a:t>
             </a:fld>
             <a:endParaRPr lang="en-US" dirty="0"/>
           </a:p>
@@ -2415,7 +2415,7 @@
           <a:p>
             <a:fld id="{D93354DC-EF94-4EEC-9481-FB469B037A91}" type="datetime1">
               <a:rPr lang="en-US" smtClean="0"/>
-              <a:t>10/22/2018</a:t>
+              <a:t>10/29/2018</a:t>
             </a:fld>
             <a:endParaRPr lang="en-US" dirty="0"/>
           </a:p>
@@ -2534,7 +2534,7 @@
           <a:p>
             <a:fld id="{D9254362-7AEE-43C5-AEE4-AC33DABFA22C}" type="datetime1">
               <a:rPr lang="en-US" smtClean="0"/>
-              <a:t>10/22/2018</a:t>
+              <a:t>10/29/2018</a:t>
             </a:fld>
             <a:endParaRPr lang="en-US" dirty="0"/>
           </a:p>
@@ -2642,7 +2642,7 @@
           <a:p>
             <a:fld id="{11099A4A-02E7-4A08-B2C5-E4EBFFB64A84}" type="datetime1">
               <a:rPr lang="en-US" smtClean="0"/>
-              <a:t>10/22/2018</a:t>
+              <a:t>10/29/2018</a:t>
             </a:fld>
             <a:endParaRPr lang="en-US" dirty="0"/>
           </a:p>
@@ -3009,7 +3009,7 @@
           <a:p>
             <a:fld id="{39203F7C-D20A-49F8-B888-2E46A7855A5C}" type="datetime1">
               <a:rPr lang="en-US" smtClean="0"/>
-              <a:t>10/22/2018</a:t>
+              <a:t>10/29/2018</a:t>
             </a:fld>
             <a:endParaRPr lang="en-US" dirty="0"/>
           </a:p>
@@ -3392,7 +3392,7 @@
           <a:p>
             <a:fld id="{748DD5FD-15BD-4496-BE9E-D1DBB8EB5739}" type="datetime1">
               <a:rPr lang="en-US" smtClean="0"/>
-              <a:t>10/22/2018</a:t>
+              <a:t>10/29/2018</a:t>
             </a:fld>
             <a:endParaRPr lang="en-US" dirty="0"/>
           </a:p>
@@ -3602,7 +3602,7 @@
           <a:p>
             <a:fld id="{4D3E5F9C-F2B8-4D4B-8FB9-614589F410D4}" type="datetime1">
               <a:rPr lang="en-US" smtClean="0"/>
-              <a:t>10/22/2018</a:t>
+              <a:t>10/29/2018</a:t>
             </a:fld>
             <a:endParaRPr lang="en-US" dirty="0"/>
           </a:p>
@@ -10227,7 +10227,7 @@
           <a:graphicData uri="http://schemas.openxmlformats.org/presentationml/2006/ole">
             <mc:AlternateContent xmlns:mc="http://schemas.openxmlformats.org/markup-compatibility/2006">
               <mc:Choice xmlns:v="urn:schemas-microsoft-com:vml" Requires="v">
-                <p:oleObj spid="_x0000_s337000" name="Equation" r:id="rId3" imgW="1079280" imgH="736560" progId="Equation.DSMT4">
+                <p:oleObj spid="_x0000_s337006" name="Equation" r:id="rId3" imgW="1079280" imgH="736560" progId="Equation.DSMT4">
                   <p:embed/>
                 </p:oleObj>
               </mc:Choice>
@@ -10297,7 +10297,7 @@
           <a:graphicData uri="http://schemas.openxmlformats.org/presentationml/2006/ole">
             <mc:AlternateContent xmlns:mc="http://schemas.openxmlformats.org/markup-compatibility/2006">
               <mc:Choice xmlns:v="urn:schemas-microsoft-com:vml" Requires="v">
-                <p:oleObj spid="_x0000_s337001" name="Equation" r:id="rId5" imgW="660240" imgH="736560" progId="Equation.DSMT4">
+                <p:oleObj spid="_x0000_s337007" name="Equation" r:id="rId5" imgW="660240" imgH="736560" progId="Equation.DSMT4">
                   <p:embed/>
                 </p:oleObj>
               </mc:Choice>
@@ -10367,7 +10367,7 @@
           <a:graphicData uri="http://schemas.openxmlformats.org/presentationml/2006/ole">
             <mc:AlternateContent xmlns:mc="http://schemas.openxmlformats.org/markup-compatibility/2006">
               <mc:Choice xmlns:v="urn:schemas-microsoft-com:vml" Requires="v">
-                <p:oleObj spid="_x0000_s337002" name="Equation" r:id="rId7" imgW="2197080" imgH="774360" progId="Equation.DSMT4">
+                <p:oleObj spid="_x0000_s337008" name="Equation" r:id="rId7" imgW="2197080" imgH="774360" progId="Equation.DSMT4">
                   <p:embed/>
                 </p:oleObj>
               </mc:Choice>
@@ -11209,7 +11209,7 @@
           <a:graphicData uri="http://schemas.openxmlformats.org/presentationml/2006/ole">
             <mc:AlternateContent xmlns:mc="http://schemas.openxmlformats.org/markup-compatibility/2006">
               <mc:Choice xmlns:v="urn:schemas-microsoft-com:vml" Requires="v">
-                <p:oleObj spid="_x0000_s337988" name="Equation" r:id="rId3" imgW="1854000" imgH="774360" progId="Equation.DSMT4">
+                <p:oleObj spid="_x0000_s337992" name="Equation" r:id="rId3" imgW="1854000" imgH="774360" progId="Equation.DSMT4">
                   <p:embed/>
                 </p:oleObj>
               </mc:Choice>
@@ -11279,7 +11279,7 @@
           <a:graphicData uri="http://schemas.openxmlformats.org/presentationml/2006/ole">
             <mc:AlternateContent xmlns:mc="http://schemas.openxmlformats.org/markup-compatibility/2006">
               <mc:Choice xmlns:v="urn:schemas-microsoft-com:vml" Requires="v">
-                <p:oleObj spid="_x0000_s337989" name="Equation" r:id="rId5" imgW="1688760" imgH="774360" progId="Equation.DSMT4">
+                <p:oleObj spid="_x0000_s337993" name="Equation" r:id="rId5" imgW="1688760" imgH="774360" progId="Equation.DSMT4">
                   <p:embed/>
                 </p:oleObj>
               </mc:Choice>
@@ -11614,7 +11614,7 @@
           <a:graphicData uri="http://schemas.openxmlformats.org/presentationml/2006/ole">
             <mc:AlternateContent xmlns:mc="http://schemas.openxmlformats.org/markup-compatibility/2006">
               <mc:Choice xmlns:v="urn:schemas-microsoft-com:vml" Requires="v">
-                <p:oleObj spid="_x0000_s339012" name="Equation" r:id="rId3" imgW="1155600" imgH="393480" progId="Equation.DSMT4">
+                <p:oleObj spid="_x0000_s339016" name="Equation" r:id="rId3" imgW="1155600" imgH="393480" progId="Equation.DSMT4">
                   <p:embed/>
                 </p:oleObj>
               </mc:Choice>
@@ -11684,7 +11684,7 @@
           <a:graphicData uri="http://schemas.openxmlformats.org/presentationml/2006/ole">
             <mc:AlternateContent xmlns:mc="http://schemas.openxmlformats.org/markup-compatibility/2006">
               <mc:Choice xmlns:v="urn:schemas-microsoft-com:vml" Requires="v">
-                <p:oleObj spid="_x0000_s339013" name="Equation" r:id="rId5" imgW="5397480" imgH="3848040" progId="Equation.DSMT4">
+                <p:oleObj spid="_x0000_s339017" name="Equation" r:id="rId5" imgW="5397480" imgH="3848040" progId="Equation.DSMT4">
                   <p:embed/>
                 </p:oleObj>
               </mc:Choice>
@@ -12817,7 +12817,7 @@
           <a:graphicData uri="http://schemas.openxmlformats.org/presentationml/2006/ole">
             <mc:AlternateContent xmlns:mc="http://schemas.openxmlformats.org/markup-compatibility/2006">
               <mc:Choice xmlns:v="urn:schemas-microsoft-com:vml" Requires="v">
-                <p:oleObj spid="_x0000_s340026" name="Equation" r:id="rId3" imgW="647640" imgH="723600" progId="Equation.DSMT4">
+                <p:oleObj spid="_x0000_s340030" name="Equation" r:id="rId3" imgW="647640" imgH="723600" progId="Equation.DSMT4">
                   <p:embed/>
                 </p:oleObj>
               </mc:Choice>
@@ -12887,7 +12887,7 @@
           <a:graphicData uri="http://schemas.openxmlformats.org/presentationml/2006/ole">
             <mc:AlternateContent xmlns:mc="http://schemas.openxmlformats.org/markup-compatibility/2006">
               <mc:Choice xmlns:v="urn:schemas-microsoft-com:vml" Requires="v">
-                <p:oleObj spid="_x0000_s340027" name="Equation" r:id="rId5" imgW="1612800" imgH="723600" progId="Equation.DSMT4">
+                <p:oleObj spid="_x0000_s340031" name="Equation" r:id="rId5" imgW="1612800" imgH="723600" progId="Equation.DSMT4">
                   <p:embed/>
                 </p:oleObj>
               </mc:Choice>
@@ -16249,7 +16249,7 @@
           <a:graphicData uri="http://schemas.openxmlformats.org/presentationml/2006/ole">
             <mc:AlternateContent xmlns:mc="http://schemas.openxmlformats.org/markup-compatibility/2006">
               <mc:Choice xmlns:v="urn:schemas-microsoft-com:vml" Requires="v">
-                <p:oleObj spid="_x0000_s341012" name="Equation" r:id="rId3" imgW="203040" imgH="203040" progId="Equation.DSMT4">
+                <p:oleObj spid="_x0000_s341014" name="Equation" r:id="rId3" imgW="203040" imgH="203040" progId="Equation.DSMT4">
                   <p:embed/>
                 </p:oleObj>
               </mc:Choice>
@@ -16916,56 +16916,6 @@
           <a:chExt cx="0" cy="0"/>
         </a:xfrm>
       </p:grpSpPr>
-      <p:sp>
-        <p:nvSpPr>
-          <p:cNvPr id="55298" name="Title 1"/>
-          <p:cNvSpPr>
-            <a:spLocks noGrp="1"/>
-          </p:cNvSpPr>
-          <p:nvPr>
-            <p:ph type="title"/>
-          </p:nvPr>
-        </p:nvSpPr>
-        <p:spPr>
-          <a:xfrm>
-            <a:off x="1981200" y="277813"/>
-            <a:ext cx="8229600" cy="900112"/>
-          </a:xfrm>
-        </p:spPr>
-        <p:txBody>
-          <a:bodyPr/>
-          <a:lstStyle/>
-          <a:p>
-            <a:endParaRPr lang="en-US">
-              <a:latin typeface="Arial" charset="0"/>
-            </a:endParaRPr>
-          </a:p>
-        </p:txBody>
-      </p:sp>
-      <p:sp>
-        <p:nvSpPr>
-          <p:cNvPr id="55299" name="Content Placeholder 2"/>
-          <p:cNvSpPr>
-            <a:spLocks noGrp="1"/>
-          </p:cNvSpPr>
-          <p:nvPr>
-            <p:ph idx="1"/>
-          </p:nvPr>
-        </p:nvSpPr>
-        <p:spPr>
-          <a:xfrm>
-            <a:off x="1981200" y="1295401"/>
-            <a:ext cx="8229600" cy="4530725"/>
-          </a:xfrm>
-        </p:spPr>
-        <p:txBody>
-          <a:bodyPr/>
-          <a:lstStyle/>
-          <a:p>
-            <a:endParaRPr lang="en-US"/>
-          </a:p>
-        </p:txBody>
-      </p:sp>
       <p:sp>
         <p:nvSpPr>
           <p:cNvPr id="55300" name="TextBox 3"/>

</xml_diff>